<commit_message>
Agenda and MoM Roadmap meeting 231019
</commit_message>
<xml_diff>
--- a/5.0 Draft/Meetings/230915/Roadmap summary.pptx
+++ b/5.0 Draft/Meetings/230915/Roadmap summary.pptx
@@ -9,6 +9,12 @@
   </p:notesMasterIdLst>
   <p:sldIdLst>
     <p:sldId id="256" r:id="rId8"/>
+    <p:sldId id="257" r:id="rId9"/>
+    <p:sldId id="258" r:id="rId10"/>
+    <p:sldId id="259" r:id="rId11"/>
+    <p:sldId id="260" r:id="rId12"/>
+    <p:sldId id="261" r:id="rId13"/>
+    <p:sldId id="262" r:id="rId14"/>
   </p:sldIdLst>
   <p:sldSz cx="9144000" cy="5715000"/>
   <p:notesSz cx="6858000" cy="9144000"/>
@@ -3259,7 +3265,7 @@
       </p:grpSpPr>
       <p:sp>
         <p:nvSpPr>
-          <p:cNvPr id="101" name="V5.0"/>
+          <p:cNvPr id="101" name="Eclipse Arrowhead v5.0"/>
           <p:cNvSpPr txBox="1"/>
           <p:nvPr>
             <p:ph type="title"/>
@@ -3276,14 +3282,88 @@
           <a:p>
             <a:pPr/>
             <a:r>
-              <a:t>V5.0</a:t>
+              <a:t>Eclipse Arrowhead v5.0</a:t>
             </a:r>
           </a:p>
         </p:txBody>
       </p:sp>
       <p:sp>
         <p:nvSpPr>
-          <p:cNvPr id="102" name="Open point of discussion…"/>
+          <p:cNvPr id="102" name="Prof. Jerker Delsing"/>
+          <p:cNvSpPr txBox="1"/>
+          <p:nvPr>
+            <p:ph type="body" sz="quarter" idx="1"/>
+          </p:nvPr>
+        </p:nvSpPr>
+        <p:spPr>
+          <a:prstGeom prst="rect">
+            <a:avLst/>
+          </a:prstGeom>
+        </p:spPr>
+        <p:txBody>
+          <a:bodyPr/>
+          <a:lstStyle/>
+          <a:p>
+            <a:pPr/>
+            <a:r>
+              <a:t>Prof. Jerker Delsing</a:t>
+            </a:r>
+          </a:p>
+        </p:txBody>
+      </p:sp>
+    </p:spTree>
+  </p:cSld>
+  <p:clrMapOvr>
+    <a:masterClrMapping/>
+  </p:clrMapOvr>
+  <p:transition xmlns:p14="http://schemas.microsoft.com/office/powerpoint/2010/main" spd="med" advClick="1"/>
+</p:sld>
+</file>
+
+<file path=ppt/slides/slide2.xml><?xml version="1.0" encoding="utf-8"?>
+<p:sld xmlns:a="http://schemas.openxmlformats.org/drawingml/2006/main" xmlns:r="http://schemas.openxmlformats.org/officeDocument/2006/relationships" xmlns:p="http://schemas.openxmlformats.org/presentationml/2006/main" xmlns:m="http://schemas.openxmlformats.org/officeDocument/2006/math" xmlns:a14="http://schemas.microsoft.com/office/drawing/2010/main" showMasterSp="1" showMasterPhAnim="1">
+  <p:cSld>
+    <p:spTree>
+      <p:nvGrpSpPr>
+        <p:cNvPr id="1" name=""/>
+        <p:cNvGrpSpPr/>
+        <p:nvPr/>
+      </p:nvGrpSpPr>
+      <p:grpSpPr>
+        <a:xfrm>
+          <a:off x="0" y="0"/>
+          <a:ext cx="0" cy="0"/>
+          <a:chOff x="0" y="0"/>
+          <a:chExt cx="0" cy="0"/>
+        </a:xfrm>
+      </p:grpSpPr>
+      <p:sp>
+        <p:nvSpPr>
+          <p:cNvPr id="104" name="Long journey"/>
+          <p:cNvSpPr txBox="1"/>
+          <p:nvPr>
+            <p:ph type="title"/>
+          </p:nvPr>
+        </p:nvSpPr>
+        <p:spPr>
+          <a:prstGeom prst="rect">
+            <a:avLst/>
+          </a:prstGeom>
+        </p:spPr>
+        <p:txBody>
+          <a:bodyPr/>
+          <a:lstStyle/>
+          <a:p>
+            <a:pPr/>
+            <a:r>
+              <a:t>Long journey </a:t>
+            </a:r>
+          </a:p>
+        </p:txBody>
+      </p:sp>
+      <p:sp>
+        <p:nvSpPr>
+          <p:cNvPr id="105" name="Started fall 2022…"/>
           <p:cNvSpPr txBox="1"/>
           <p:nvPr>
             <p:ph type="body" idx="1"/>
@@ -3298,159 +3378,691 @@
           <a:bodyPr/>
           <a:lstStyle/>
           <a:p>
-            <a:pPr marL="185118" indent="-185118" defTabSz="315468">
+            <a:pPr/>
+            <a:r>
+              <a:t>Started fall 2022</a:t>
+            </a:r>
+          </a:p>
+          <a:p>
+            <a:pPr/>
+            <a:r>
+              <a:t>Roadmap WG meetings roughly every 3:ed week for one year</a:t>
+            </a:r>
+          </a:p>
+          <a:p>
+            <a:pPr lvl="1" marL="268288" indent="188911">
+              <a:buSzTx/>
+              <a:buNone/>
+            </a:pPr>
+            <a:r>
+              <a:t>10-20+ people working </a:t>
+            </a:r>
+          </a:p>
+          <a:p>
+            <a:pPr/>
+            <a:r>
+              <a:t>May 2023 we still had 10 issues </a:t>
+            </a:r>
+          </a:p>
+          <a:p>
+            <a:pPr lvl="1" marL="268288" indent="188911">
+              <a:buSzTx/>
+              <a:buNone/>
+            </a:pPr>
+            <a:r>
+              <a:rPr u="sng">
+                <a:solidFill>
+                  <a:srgbClr val="0000FF"/>
+                </a:solidFill>
+                <a:uFill>
+                  <a:solidFill>
+                    <a:srgbClr val="0000FF"/>
+                  </a:solidFill>
+                </a:uFill>
+                <a:hlinkClick r:id="rId2" invalidUrl="" action="" tgtFrame="" tooltip="" history="1" highlightClick="0" endSnd="0"/>
+              </a:rPr>
+              <a:t>https://github.com/eclipse-arrowhead/roadmap/issues</a:t>
+            </a:r>
+          </a:p>
+          <a:p>
+            <a:pPr/>
+            <a:r>
+              <a:t>Sept 2023 the Generic SoSD (GSoSD) document is ready for prime time.</a:t>
+            </a:r>
+          </a:p>
+          <a:p>
+            <a:pPr lvl="1" marL="268288" indent="188911">
+              <a:buSzTx/>
+              <a:buNone/>
+            </a:pPr>
+            <a:r>
+              <a:t>GSosD core systems v5.0</a:t>
+            </a:r>
+          </a:p>
+          <a:p>
+            <a:pPr lvl="1" marL="268288" indent="188911">
+              <a:buSzTx/>
+              <a:buNone/>
+            </a:pPr>
+            <a:r>
+              <a:t>GSoSD support systems v5.0 </a:t>
+            </a:r>
+          </a:p>
+        </p:txBody>
+      </p:sp>
+    </p:spTree>
+  </p:cSld>
+  <p:clrMapOvr>
+    <a:masterClrMapping/>
+  </p:clrMapOvr>
+  <p:transition xmlns:p14="http://schemas.microsoft.com/office/powerpoint/2010/main" spd="med" advClick="1"/>
+</p:sld>
+</file>
+
+<file path=ppt/slides/slide3.xml><?xml version="1.0" encoding="utf-8"?>
+<p:sld xmlns:a="http://schemas.openxmlformats.org/drawingml/2006/main" xmlns:r="http://schemas.openxmlformats.org/officeDocument/2006/relationships" xmlns:p="http://schemas.openxmlformats.org/presentationml/2006/main" xmlns:m="http://schemas.openxmlformats.org/officeDocument/2006/math" xmlns:a14="http://schemas.microsoft.com/office/drawing/2010/main" showMasterSp="1" showMasterPhAnim="1">
+  <p:cSld>
+    <p:spTree>
+      <p:nvGrpSpPr>
+        <p:cNvPr id="1" name=""/>
+        <p:cNvGrpSpPr/>
+        <p:nvPr/>
+      </p:nvGrpSpPr>
+      <p:grpSpPr>
+        <a:xfrm>
+          <a:off x="0" y="0"/>
+          <a:ext cx="0" cy="0"/>
+          <a:chOff x="0" y="0"/>
+          <a:chExt cx="0" cy="0"/>
+        </a:xfrm>
+      </p:grpSpPr>
+      <p:sp>
+        <p:nvSpPr>
+          <p:cNvPr id="107" name="Major updates"/>
+          <p:cNvSpPr txBox="1"/>
+          <p:nvPr>
+            <p:ph type="title"/>
+          </p:nvPr>
+        </p:nvSpPr>
+        <p:spPr>
+          <a:prstGeom prst="rect">
+            <a:avLst/>
+          </a:prstGeom>
+        </p:spPr>
+        <p:txBody>
+          <a:bodyPr/>
+          <a:lstStyle/>
+          <a:p>
+            <a:pPr/>
+            <a:r>
+              <a:t>Major updates</a:t>
+            </a:r>
+          </a:p>
+        </p:txBody>
+      </p:sp>
+      <p:sp>
+        <p:nvSpPr>
+          <p:cNvPr id="108" name="The Eclipse Arrowhead project focus is to provide microservices which produces and consumes microservice at the edge.…"/>
+          <p:cNvSpPr txBox="1"/>
+          <p:nvPr>
+            <p:ph type="body" idx="1"/>
+          </p:nvPr>
+        </p:nvSpPr>
+        <p:spPr>
+          <a:prstGeom prst="rect">
+            <a:avLst/>
+          </a:prstGeom>
+        </p:spPr>
+        <p:txBody>
+          <a:bodyPr/>
+          <a:lstStyle/>
+          <a:p>
+            <a:pPr/>
+          </a:p>
+          <a:p>
+            <a:pPr marL="0" indent="0">
+              <a:defRPr sz="2300"/>
+            </a:pPr>
+            <a:r>
+              <a:t>The Eclipse Arrowhead project focus is to provide microservices which produces and consumes microservice at the edge. </a:t>
+            </a:r>
+          </a:p>
+          <a:p>
+            <a:pPr marL="0" indent="0">
+              <a:defRPr sz="2300"/>
+            </a:pPr>
+            <a:r>
+              <a:t>Eclipse Arrowhead provides an microservice SOA architecture and reference implementation to be deployed on heterogeneous devices from deep edge to fog with interoperability to cloud servers.</a:t>
+            </a:r>
+          </a:p>
+          <a:p>
+            <a:pPr/>
+          </a:p>
+        </p:txBody>
+      </p:sp>
+    </p:spTree>
+  </p:cSld>
+  <p:clrMapOvr>
+    <a:masterClrMapping/>
+  </p:clrMapOvr>
+  <p:transition xmlns:p14="http://schemas.microsoft.com/office/powerpoint/2010/main" spd="med" advClick="1"/>
+</p:sld>
+</file>
+
+<file path=ppt/slides/slide4.xml><?xml version="1.0" encoding="utf-8"?>
+<p:sld xmlns:a="http://schemas.openxmlformats.org/drawingml/2006/main" xmlns:r="http://schemas.openxmlformats.org/officeDocument/2006/relationships" xmlns:p="http://schemas.openxmlformats.org/presentationml/2006/main" xmlns:m="http://schemas.openxmlformats.org/officeDocument/2006/math" xmlns:a14="http://schemas.microsoft.com/office/drawing/2010/main" showMasterSp="1" showMasterPhAnim="1">
+  <p:cSld>
+    <p:spTree>
+      <p:nvGrpSpPr>
+        <p:cNvPr id="1" name=""/>
+        <p:cNvGrpSpPr/>
+        <p:nvPr/>
+      </p:nvGrpSpPr>
+      <p:grpSpPr>
+        <a:xfrm>
+          <a:off x="0" y="0"/>
+          <a:ext cx="0" cy="0"/>
+          <a:chOff x="0" y="0"/>
+          <a:chExt cx="0" cy="0"/>
+        </a:xfrm>
+      </p:grpSpPr>
+      <p:sp>
+        <p:nvSpPr>
+          <p:cNvPr id="110" name="Vocabulary"/>
+          <p:cNvSpPr txBox="1"/>
+          <p:nvPr>
+            <p:ph type="title"/>
+          </p:nvPr>
+        </p:nvSpPr>
+        <p:spPr>
+          <a:prstGeom prst="rect">
+            <a:avLst/>
+          </a:prstGeom>
+        </p:spPr>
+        <p:txBody>
+          <a:bodyPr/>
+          <a:lstStyle/>
+          <a:p>
+            <a:pPr/>
+            <a:r>
+              <a:t>Vocabulary</a:t>
+            </a:r>
+          </a:p>
+        </p:txBody>
+      </p:sp>
+      <p:sp>
+        <p:nvSpPr>
+          <p:cNvPr id="111" name="Main message…"/>
+          <p:cNvSpPr txBox="1"/>
+          <p:nvPr>
+            <p:ph type="body" idx="1"/>
+          </p:nvPr>
+        </p:nvSpPr>
+        <p:spPr>
+          <a:prstGeom prst="rect">
+            <a:avLst/>
+          </a:prstGeom>
+        </p:spPr>
+        <p:txBody>
+          <a:bodyPr/>
+          <a:lstStyle/>
+          <a:p>
+            <a:pPr/>
+            <a:r>
+              <a:t>Main message</a:t>
+            </a:r>
+          </a:p>
+          <a:p>
+            <a:pPr/>
+          </a:p>
+          <a:p>
+            <a:pPr>
+              <a:defRPr b="1" sz="3000"/>
+            </a:pPr>
+            <a:r>
+              <a:t>Microsystems and microservices at the edge</a:t>
+            </a:r>
+          </a:p>
+          <a:p>
+            <a:pPr>
+              <a:defRPr b="1"/>
+            </a:pPr>
+          </a:p>
+          <a:p>
+            <a:pPr marL="200526" indent="-200526">
+              <a:buSzPct val="100000"/>
+              <a:buChar char="•"/>
+            </a:pPr>
+            <a:r>
+              <a:t>We will use microsystem and microservice and system and service interchangeable to simplify writing, while misunderstandings can be expected to minimal.</a:t>
+            </a:r>
+          </a:p>
+          <a:p>
+            <a:pPr marL="200526" indent="-200526">
+              <a:buSzPct val="100000"/>
+              <a:buChar char="•"/>
+            </a:pPr>
+            <a:r>
+              <a:t>Naming convention for microsystem, microservices and local clouds still to be defined. Target is v5.1.</a:t>
+            </a:r>
+          </a:p>
+        </p:txBody>
+      </p:sp>
+    </p:spTree>
+  </p:cSld>
+  <p:clrMapOvr>
+    <a:masterClrMapping/>
+  </p:clrMapOvr>
+  <p:transition xmlns:p14="http://schemas.microsoft.com/office/powerpoint/2010/main" spd="med" advClick="1"/>
+</p:sld>
+</file>
+
+<file path=ppt/slides/slide5.xml><?xml version="1.0" encoding="utf-8"?>
+<p:sld xmlns:a="http://schemas.openxmlformats.org/drawingml/2006/main" xmlns:r="http://schemas.openxmlformats.org/officeDocument/2006/relationships" xmlns:p="http://schemas.openxmlformats.org/presentationml/2006/main" xmlns:m="http://schemas.openxmlformats.org/officeDocument/2006/math" xmlns:a14="http://schemas.microsoft.com/office/drawing/2010/main" showMasterSp="1" showMasterPhAnim="1">
+  <p:cSld>
+    <p:spTree>
+      <p:nvGrpSpPr>
+        <p:cNvPr id="1" name=""/>
+        <p:cNvGrpSpPr/>
+        <p:nvPr/>
+      </p:nvGrpSpPr>
+      <p:grpSpPr>
+        <a:xfrm>
+          <a:off x="0" y="0"/>
+          <a:ext cx="0" cy="0"/>
+          <a:chOff x="0" y="0"/>
+          <a:chExt cx="0" cy="0"/>
+        </a:xfrm>
+      </p:grpSpPr>
+      <p:sp>
+        <p:nvSpPr>
+          <p:cNvPr id="113" name="Core systems"/>
+          <p:cNvSpPr txBox="1"/>
+          <p:nvPr>
+            <p:ph type="title"/>
+          </p:nvPr>
+        </p:nvSpPr>
+        <p:spPr>
+          <a:prstGeom prst="rect">
+            <a:avLst/>
+          </a:prstGeom>
+        </p:spPr>
+        <p:txBody>
+          <a:bodyPr/>
+          <a:lstStyle/>
+          <a:p>
+            <a:pPr lvl="1"/>
+            <a:r>
+              <a:t>Core systems</a:t>
+            </a:r>
+          </a:p>
+        </p:txBody>
+      </p:sp>
+      <p:sp>
+        <p:nvSpPr>
+          <p:cNvPr id="114" name="Service Registry…"/>
+          <p:cNvSpPr txBox="1"/>
+          <p:nvPr>
+            <p:ph type="body" idx="1"/>
+          </p:nvPr>
+        </p:nvSpPr>
+        <p:spPr>
+          <a:xfrm>
+            <a:off x="799889" y="1008543"/>
+            <a:ext cx="7862604" cy="4166140"/>
+          </a:xfrm>
+          <a:prstGeom prst="rect">
+            <a:avLst/>
+          </a:prstGeom>
+        </p:spPr>
+        <p:txBody>
+          <a:bodyPr/>
+          <a:lstStyle/>
+          <a:p>
+            <a:pPr/>
+            <a:r>
+              <a:t>Service Registry</a:t>
+            </a:r>
+          </a:p>
+          <a:p>
+            <a:pPr/>
+            <a:r>
+              <a:t>Authorisation system</a:t>
+            </a:r>
+          </a:p>
+          <a:p>
+            <a:pPr>
+              <a:defRPr b="1"/>
+            </a:pPr>
+            <a:r>
+              <a:t>Authentication system  - new</a:t>
+            </a:r>
+          </a:p>
+          <a:p>
+            <a:pPr lvl="1" marL="268288" indent="188911">
+              <a:buSzTx/>
+              <a:buNone/>
+            </a:pPr>
+            <a:r>
+              <a:t>separated from the Authorisation system</a:t>
+            </a:r>
+          </a:p>
+          <a:p>
+            <a:pPr lvl="1" marL="268288" indent="188911">
+              <a:buSzTx/>
+              <a:buNone/>
+            </a:pPr>
+            <a:r>
+              <a:t>additional authentication mechanisms will be considered from v5.1</a:t>
+            </a:r>
+          </a:p>
+          <a:p>
+            <a:pPr/>
+            <a:r>
+              <a:t>Orchestration system</a:t>
+            </a:r>
+          </a:p>
+          <a:p>
+            <a:pPr/>
+          </a:p>
+        </p:txBody>
+      </p:sp>
+    </p:spTree>
+  </p:cSld>
+  <p:clrMapOvr>
+    <a:masterClrMapping/>
+  </p:clrMapOvr>
+  <p:transition xmlns:p14="http://schemas.microsoft.com/office/powerpoint/2010/main" spd="med" advClick="1"/>
+</p:sld>
+</file>
+
+<file path=ppt/slides/slide6.xml><?xml version="1.0" encoding="utf-8"?>
+<p:sld xmlns:a="http://schemas.openxmlformats.org/drawingml/2006/main" xmlns:r="http://schemas.openxmlformats.org/officeDocument/2006/relationships" xmlns:p="http://schemas.openxmlformats.org/presentationml/2006/main" xmlns:m="http://schemas.openxmlformats.org/officeDocument/2006/math" xmlns:a14="http://schemas.microsoft.com/office/drawing/2010/main" showMasterSp="1" showMasterPhAnim="1">
+  <p:cSld>
+    <p:spTree>
+      <p:nvGrpSpPr>
+        <p:cNvPr id="1" name=""/>
+        <p:cNvGrpSpPr/>
+        <p:nvPr/>
+      </p:nvGrpSpPr>
+      <p:grpSpPr>
+        <a:xfrm>
+          <a:off x="0" y="0"/>
+          <a:ext cx="0" cy="0"/>
+          <a:chOff x="0" y="0"/>
+          <a:chExt cx="0" cy="0"/>
+        </a:xfrm>
+      </p:grpSpPr>
+      <p:sp>
+        <p:nvSpPr>
+          <p:cNvPr id="116" name="Integration into brown field operations"/>
+          <p:cNvSpPr txBox="1"/>
+          <p:nvPr>
+            <p:ph type="title"/>
+          </p:nvPr>
+        </p:nvSpPr>
+        <p:spPr>
+          <a:prstGeom prst="rect">
+            <a:avLst/>
+          </a:prstGeom>
+        </p:spPr>
+        <p:txBody>
+          <a:bodyPr/>
+          <a:lstStyle/>
+          <a:p>
+            <a:pPr/>
+            <a:r>
+              <a:t>Integration into brown field operations</a:t>
+            </a:r>
+          </a:p>
+        </p:txBody>
+      </p:sp>
+      <p:sp>
+        <p:nvSpPr>
+          <p:cNvPr id="117" name="Relaxation of shall definitions and usage  to recommended usage…"/>
+          <p:cNvSpPr txBox="1"/>
+          <p:nvPr>
+            <p:ph type="body" idx="1"/>
+          </p:nvPr>
+        </p:nvSpPr>
+        <p:spPr>
+          <a:prstGeom prst="rect">
+            <a:avLst/>
+          </a:prstGeom>
+        </p:spPr>
+        <p:txBody>
+          <a:bodyPr/>
+          <a:lstStyle/>
+          <a:p>
+            <a:pPr marL="200526" indent="-200526">
+              <a:buSzPct val="100000"/>
+              <a:buChar char="•"/>
+            </a:pPr>
+            <a:r>
+              <a:t>Relaxation of shall definitions and usage  to recommended usage</a:t>
+            </a:r>
+          </a:p>
+          <a:p>
+            <a:pPr lvl="1" marL="539999" indent="-179999"/>
+            <a:r>
+              <a:t>Supporting integration to existing brown field technology and company conventions!</a:t>
+            </a:r>
+          </a:p>
+          <a:p>
+            <a:pPr lvl="1" marL="539999" indent="-179999"/>
+            <a:r>
+              <a:t>Special notes on that deviations from recommendation will render less architecture support for desired properties like e.g.</a:t>
+            </a:r>
+          </a:p>
+          <a:p>
+            <a:pPr lvl="2" marL="942000" indent="-180000"/>
+            <a:r>
+              <a:t>real time, security, safety, …. </a:t>
+            </a:r>
+          </a:p>
+        </p:txBody>
+      </p:sp>
+    </p:spTree>
+  </p:cSld>
+  <p:clrMapOvr>
+    <a:masterClrMapping/>
+  </p:clrMapOvr>
+  <p:transition xmlns:p14="http://schemas.microsoft.com/office/powerpoint/2010/main" spd="med" advClick="1"/>
+</p:sld>
+</file>
+
+<file path=ppt/slides/slide7.xml><?xml version="1.0" encoding="utf-8"?>
+<p:sld xmlns:a="http://schemas.openxmlformats.org/drawingml/2006/main" xmlns:r="http://schemas.openxmlformats.org/officeDocument/2006/relationships" xmlns:p="http://schemas.openxmlformats.org/presentationml/2006/main" xmlns:m="http://schemas.openxmlformats.org/officeDocument/2006/math" xmlns:a14="http://schemas.microsoft.com/office/drawing/2010/main" showMasterSp="1" showMasterPhAnim="1">
+  <p:cSld>
+    <p:spTree>
+      <p:nvGrpSpPr>
+        <p:cNvPr id="1" name=""/>
+        <p:cNvGrpSpPr/>
+        <p:nvPr/>
+      </p:nvGrpSpPr>
+      <p:grpSpPr>
+        <a:xfrm>
+          <a:off x="0" y="0"/>
+          <a:ext cx="0" cy="0"/>
+          <a:chOff x="0" y="0"/>
+          <a:chExt cx="0" cy="0"/>
+        </a:xfrm>
+      </p:grpSpPr>
+      <p:sp>
+        <p:nvSpPr>
+          <p:cNvPr id="119" name="V5.0"/>
+          <p:cNvSpPr txBox="1"/>
+          <p:nvPr>
+            <p:ph type="title"/>
+          </p:nvPr>
+        </p:nvSpPr>
+        <p:spPr>
+          <a:prstGeom prst="rect">
+            <a:avLst/>
+          </a:prstGeom>
+        </p:spPr>
+        <p:txBody>
+          <a:bodyPr/>
+          <a:lstStyle/>
+          <a:p>
+            <a:pPr/>
+            <a:r>
+              <a:t>V5.0</a:t>
+            </a:r>
+          </a:p>
+        </p:txBody>
+      </p:sp>
+      <p:sp>
+        <p:nvSpPr>
+          <p:cNvPr id="120" name="Open point of discussion…"/>
+          <p:cNvSpPr txBox="1"/>
+          <p:nvPr>
+            <p:ph type="body" idx="1"/>
+          </p:nvPr>
+        </p:nvSpPr>
+        <p:spPr>
+          <a:prstGeom prst="rect">
+            <a:avLst/>
+          </a:prstGeom>
+        </p:spPr>
+        <p:txBody>
+          <a:bodyPr/>
+          <a:lstStyle/>
+          <a:p>
+            <a:pPr marL="222679" indent="-222679" defTabSz="379475">
               <a:spcBef>
-                <a:spcPts val="200"/>
+                <a:spcPts val="300"/>
               </a:spcBef>
-              <a:defRPr sz="1380"/>
+              <a:defRPr sz="1660"/>
             </a:pPr>
             <a:r>
               <a:t>Open point of discussion</a:t>
             </a:r>
           </a:p>
           <a:p>
-            <a:pPr marL="185118" indent="-185118" defTabSz="315468">
+            <a:pPr marL="222679" indent="-222679" defTabSz="379475">
               <a:spcBef>
-                <a:spcPts val="200"/>
+                <a:spcPts val="300"/>
               </a:spcBef>
-              <a:defRPr sz="1380"/>
+              <a:defRPr sz="1660"/>
             </a:pPr>
             <a:r>
-              <a:t>#3 communication - not urgent - issues #69</a:t>
-            </a:r>
-          </a:p>
-          <a:p>
-            <a:pPr marL="185118" indent="-185118" defTabSz="315468">
+              <a:t>#1 Per to introduce into GSoSD - issue #58 - DONE but not merged yet</a:t>
+            </a:r>
+          </a:p>
+          <a:p>
+            <a:pPr marL="222679" indent="-222679" defTabSz="379475">
               <a:spcBef>
-                <a:spcPts val="200"/>
+                <a:spcPts val="300"/>
               </a:spcBef>
-              <a:defRPr sz="1380"/>
+              <a:defRPr sz="1660"/>
             </a:pPr>
             <a:r>
-              <a:t>#8 communication - branding - issues #68</a:t>
-            </a:r>
-          </a:p>
-          <a:p>
-            <a:pPr marL="185118" indent="-185118" defTabSz="315468">
+              <a:t>#2 Pal to add to GSoSD- issue # 66 - DONE in GSoSD</a:t>
+            </a:r>
+          </a:p>
+          <a:p>
+            <a:pPr marL="222679" indent="-222679" defTabSz="379475">
               <a:spcBef>
-                <a:spcPts val="200"/>
+                <a:spcPts val="300"/>
               </a:spcBef>
-              <a:defRPr sz="1380"/>
+              <a:defRPr sz="1660"/>
             </a:pPr>
             <a:r>
-              <a:t>#9 Technology - issue #62</a:t>
-            </a:r>
-          </a:p>
-          <a:p>
-            <a:pPr marL="185118" indent="-185118" defTabSz="315468">
+              <a:t>#3 communication - not urgent - issues #69 - to v5.1</a:t>
+            </a:r>
+          </a:p>
+          <a:p>
+            <a:pPr marL="222679" indent="-222679" defTabSz="379475">
               <a:spcBef>
-                <a:spcPts val="200"/>
+                <a:spcPts val="300"/>
               </a:spcBef>
-              <a:defRPr sz="1380"/>
+              <a:defRPr sz="1660"/>
             </a:pPr>
             <a:r>
-              <a:t>#10 Technology - issue #71</a:t>
-            </a:r>
-          </a:p>
-          <a:p>
-            <a:pPr marL="185118" indent="-185118" defTabSz="315468">
+              <a:t>#4 Felix to introduce into GSoSD - issue #67 - waiting for Felix</a:t>
+            </a:r>
+          </a:p>
+          <a:p>
+            <a:pPr marL="222679" indent="-222679" defTabSz="379475">
               <a:spcBef>
-                <a:spcPts val="200"/>
+                <a:spcPts val="300"/>
               </a:spcBef>
-              <a:defRPr sz="1380"/>
+              <a:defRPr sz="1660"/>
             </a:pPr>
-          </a:p>
-          <a:p>
-            <a:pPr marL="185118" indent="-185118" defTabSz="315468">
+            <a:r>
+              <a:t>#5 Jerker to introduce into GSoSD - issue #65 - DONE in GSoSD</a:t>
+            </a:r>
+          </a:p>
+          <a:p>
+            <a:pPr marL="222679" indent="-222679" defTabSz="379475">
               <a:spcBef>
-                <a:spcPts val="200"/>
+                <a:spcPts val="300"/>
               </a:spcBef>
-              <a:defRPr sz="1380"/>
+              <a:defRPr sz="1660"/>
             </a:pPr>
             <a:r>
-              <a:t>Closed </a:t>
-            </a:r>
-          </a:p>
-          <a:p>
-            <a:pPr marL="185118" indent="-185118" defTabSz="315468">
+              <a:t>#6 Per to introduce into the GSoSD - issue #64 - DONE but not merged yet</a:t>
+            </a:r>
+          </a:p>
+          <a:p>
+            <a:pPr marL="222679" indent="-222679" defTabSz="379475">
               <a:spcBef>
-                <a:spcPts val="200"/>
+                <a:spcPts val="300"/>
               </a:spcBef>
-              <a:defRPr sz="1380"/>
+              <a:defRPr sz="1660"/>
             </a:pPr>
             <a:r>
-              <a:t>#1 Per to introduce into GSoSD - issue #58</a:t>
-            </a:r>
-          </a:p>
-          <a:p>
-            <a:pPr marL="185118" indent="-185118" defTabSz="315468">
+              <a:t>#7 Jerker to introduce into GSoSD- issue #70 - DONE in GSoSD</a:t>
+            </a:r>
+          </a:p>
+          <a:p>
+            <a:pPr marL="222679" indent="-222679" defTabSz="379475">
               <a:spcBef>
-                <a:spcPts val="200"/>
+                <a:spcPts val="300"/>
               </a:spcBef>
-              <a:defRPr sz="1380"/>
+              <a:defRPr sz="1660"/>
             </a:pPr>
             <a:r>
-              <a:t>#2 Pal to add to GSoSD- issue # 66</a:t>
-            </a:r>
-          </a:p>
-          <a:p>
-            <a:pPr marL="185118" indent="-185118" defTabSz="315468">
+              <a:t>#8 communication - branding - issues #68 - DONE in GSoSD</a:t>
+            </a:r>
+          </a:p>
+          <a:p>
+            <a:pPr marL="222679" indent="-222679" defTabSz="379475">
               <a:spcBef>
-                <a:spcPts val="200"/>
+                <a:spcPts val="300"/>
               </a:spcBef>
-              <a:defRPr sz="1380"/>
+              <a:defRPr sz="1660"/>
             </a:pPr>
             <a:r>
-              <a:t>#4 Felix to introduce into GSoSD - issue #67</a:t>
-            </a:r>
-          </a:p>
-          <a:p>
-            <a:pPr marL="185118" indent="-185118" defTabSz="315468">
+              <a:t>#9 Technology - issue #62 - DONE in GSoSD</a:t>
+            </a:r>
+          </a:p>
+          <a:p>
+            <a:pPr marL="222679" indent="-222679" defTabSz="379475">
               <a:spcBef>
-                <a:spcPts val="200"/>
+                <a:spcPts val="300"/>
               </a:spcBef>
-              <a:defRPr sz="1380"/>
+              <a:defRPr sz="1660"/>
             </a:pPr>
             <a:r>
-              <a:t>#5 Jerker to introduce into GSoSD - issue #65</a:t>
-            </a:r>
-          </a:p>
-          <a:p>
-            <a:pPr marL="185118" indent="-185118" defTabSz="315468">
+              <a:t>#10 Technology - issue #71 - DONE in GSoSD</a:t>
+            </a:r>
+          </a:p>
+          <a:p>
+            <a:pPr marL="222679" indent="-222679" defTabSz="379475">
               <a:spcBef>
-                <a:spcPts val="200"/>
+                <a:spcPts val="300"/>
               </a:spcBef>
-              <a:defRPr sz="1380"/>
+              <a:defRPr sz="1660"/>
             </a:pPr>
-            <a:r>
-              <a:t>#6 Per to introduce into the GSoSD - issue #64</a:t>
-            </a:r>
-          </a:p>
-          <a:p>
-            <a:pPr marL="185118" indent="-185118" defTabSz="315468">
+          </a:p>
+          <a:p>
+            <a:pPr marL="222679" indent="-222679" defTabSz="379475">
               <a:spcBef>
-                <a:spcPts val="200"/>
+                <a:spcPts val="300"/>
               </a:spcBef>
-              <a:defRPr sz="1380"/>
-            </a:pPr>
-            <a:r>
-              <a:t>#7 Jerker to introduce into GSoSD- issue #70</a:t>
-            </a:r>
-          </a:p>
-          <a:p>
-            <a:pPr marL="185118" indent="-185118" defTabSz="315468">
-              <a:spcBef>
-                <a:spcPts val="200"/>
-              </a:spcBef>
-              <a:defRPr sz="1380"/>
-            </a:pPr>
-          </a:p>
-          <a:p>
-            <a:pPr marL="185118" indent="-185118" defTabSz="315468">
-              <a:spcBef>
-                <a:spcPts val="200"/>
-              </a:spcBef>
-              <a:defRPr sz="1380"/>
+              <a:defRPr sz="1660"/>
             </a:pPr>
           </a:p>
         </p:txBody>

</xml_diff>